<commit_message>
finished PPT and Handout
</commit_message>
<xml_diff>
--- a/doc/Brandstetter_MVC_02.pptx
+++ b/doc/Brandstetter_MVC_02.pptx
@@ -114,6 +114,11 @@
       </a:defRPr>
     </a:lvl9pPr>
   </p:defaultTextStyle>
+  <p:extLst>
+    <p:ext uri="{EFAFB233-063F-42B5-8137-9DF3F51BA10A}">
+      <p15:sldGuideLst xmlns:p15="http://schemas.microsoft.com/office/powerpoint/2012/main"/>
+    </p:ext>
+  </p:extLst>
 </p:presentation>
 </file>
 
@@ -266,7 +271,7 @@
           <a:p>
             <a:fld id="{5BB77033-F688-4B3A-A60F-50BC8AA82E49}" type="datetimeFigureOut">
               <a:rPr lang="de-AT" smtClean="0"/>
-              <a:t>23.02.2019</a:t>
+              <a:t>25.02.2019</a:t>
             </a:fld>
             <a:endParaRPr lang="de-AT"/>
           </a:p>
@@ -466,7 +471,7 @@
           <a:p>
             <a:fld id="{5BB77033-F688-4B3A-A60F-50BC8AA82E49}" type="datetimeFigureOut">
               <a:rPr lang="de-AT" smtClean="0"/>
-              <a:t>23.02.2019</a:t>
+              <a:t>25.02.2019</a:t>
             </a:fld>
             <a:endParaRPr lang="de-AT"/>
           </a:p>
@@ -676,7 +681,7 @@
           <a:p>
             <a:fld id="{5BB77033-F688-4B3A-A60F-50BC8AA82E49}" type="datetimeFigureOut">
               <a:rPr lang="de-AT" smtClean="0"/>
-              <a:t>23.02.2019</a:t>
+              <a:t>25.02.2019</a:t>
             </a:fld>
             <a:endParaRPr lang="de-AT"/>
           </a:p>
@@ -876,7 +881,7 @@
           <a:p>
             <a:fld id="{5BB77033-F688-4B3A-A60F-50BC8AA82E49}" type="datetimeFigureOut">
               <a:rPr lang="de-AT" smtClean="0"/>
-              <a:t>23.02.2019</a:t>
+              <a:t>25.02.2019</a:t>
             </a:fld>
             <a:endParaRPr lang="de-AT"/>
           </a:p>
@@ -1152,7 +1157,7 @@
           <a:p>
             <a:fld id="{5BB77033-F688-4B3A-A60F-50BC8AA82E49}" type="datetimeFigureOut">
               <a:rPr lang="de-AT" smtClean="0"/>
-              <a:t>23.02.2019</a:t>
+              <a:t>25.02.2019</a:t>
             </a:fld>
             <a:endParaRPr lang="de-AT"/>
           </a:p>
@@ -1420,7 +1425,7 @@
           <a:p>
             <a:fld id="{5BB77033-F688-4B3A-A60F-50BC8AA82E49}" type="datetimeFigureOut">
               <a:rPr lang="de-AT" smtClean="0"/>
-              <a:t>23.02.2019</a:t>
+              <a:t>25.02.2019</a:t>
             </a:fld>
             <a:endParaRPr lang="de-AT"/>
           </a:p>
@@ -1835,7 +1840,7 @@
           <a:p>
             <a:fld id="{5BB77033-F688-4B3A-A60F-50BC8AA82E49}" type="datetimeFigureOut">
               <a:rPr lang="de-AT" smtClean="0"/>
-              <a:t>23.02.2019</a:t>
+              <a:t>25.02.2019</a:t>
             </a:fld>
             <a:endParaRPr lang="de-AT"/>
           </a:p>
@@ -1977,7 +1982,7 @@
           <a:p>
             <a:fld id="{5BB77033-F688-4B3A-A60F-50BC8AA82E49}" type="datetimeFigureOut">
               <a:rPr lang="de-AT" smtClean="0"/>
-              <a:t>23.02.2019</a:t>
+              <a:t>25.02.2019</a:t>
             </a:fld>
             <a:endParaRPr lang="de-AT"/>
           </a:p>
@@ -2090,7 +2095,7 @@
           <a:p>
             <a:fld id="{5BB77033-F688-4B3A-A60F-50BC8AA82E49}" type="datetimeFigureOut">
               <a:rPr lang="de-AT" smtClean="0"/>
-              <a:t>23.02.2019</a:t>
+              <a:t>25.02.2019</a:t>
             </a:fld>
             <a:endParaRPr lang="de-AT"/>
           </a:p>
@@ -2403,7 +2408,7 @@
           <a:p>
             <a:fld id="{5BB77033-F688-4B3A-A60F-50BC8AA82E49}" type="datetimeFigureOut">
               <a:rPr lang="de-AT" smtClean="0"/>
-              <a:t>23.02.2019</a:t>
+              <a:t>25.02.2019</a:t>
             </a:fld>
             <a:endParaRPr lang="de-AT"/>
           </a:p>
@@ -2692,7 +2697,7 @@
           <a:p>
             <a:fld id="{5BB77033-F688-4B3A-A60F-50BC8AA82E49}" type="datetimeFigureOut">
               <a:rPr lang="de-AT" smtClean="0"/>
-              <a:t>23.02.2019</a:t>
+              <a:t>25.02.2019</a:t>
             </a:fld>
             <a:endParaRPr lang="de-AT"/>
           </a:p>
@@ -2935,7 +2940,7 @@
           <a:p>
             <a:fld id="{5BB77033-F688-4B3A-A60F-50BC8AA82E49}" type="datetimeFigureOut">
               <a:rPr lang="de-AT" smtClean="0"/>
-              <a:t>23.02.2019</a:t>
+              <a:t>25.02.2019</a:t>
             </a:fld>
             <a:endParaRPr lang="de-AT"/>
           </a:p>
@@ -3408,6 +3413,111 @@
           </a:p>
         </p:txBody>
       </p:sp>
+      <p:sp>
+        <p:nvSpPr>
+          <p:cNvPr id="4" name="TextBox 3">
+            <a:extLst>
+              <a:ext uri="{FF2B5EF4-FFF2-40B4-BE49-F238E27FC236}">
+                <a16:creationId xmlns:a16="http://schemas.microsoft.com/office/drawing/2014/main" id="{9434012A-5604-41DC-8280-574EE2B7D690}"/>
+              </a:ext>
+            </a:extLst>
+          </p:cNvPr>
+          <p:cNvSpPr txBox="1"/>
+          <p:nvPr/>
+        </p:nvSpPr>
+        <p:spPr>
+          <a:xfrm>
+            <a:off x="5265019" y="2502485"/>
+            <a:ext cx="841897" cy="1015663"/>
+          </a:xfrm>
+          <a:prstGeom prst="rect">
+            <a:avLst/>
+          </a:prstGeom>
+          <a:noFill/>
+        </p:spPr>
+        <p:txBody>
+          <a:bodyPr wrap="none" rtlCol="0">
+            <a:spAutoFit/>
+          </a:bodyPr>
+          <a:lstStyle/>
+          <a:p>
+            <a:r>
+              <a:rPr lang="de-AT" sz="6000" dirty="0"/>
+              <a:t>M</a:t>
+            </a:r>
+          </a:p>
+        </p:txBody>
+      </p:sp>
+      <p:sp>
+        <p:nvSpPr>
+          <p:cNvPr id="5" name="TextBox 4">
+            <a:extLst>
+              <a:ext uri="{FF2B5EF4-FFF2-40B4-BE49-F238E27FC236}">
+                <a16:creationId xmlns:a16="http://schemas.microsoft.com/office/drawing/2014/main" id="{12FA957C-57E0-4BBE-A556-F59F739896AF}"/>
+              </a:ext>
+            </a:extLst>
+          </p:cNvPr>
+          <p:cNvSpPr txBox="1"/>
+          <p:nvPr/>
+        </p:nvSpPr>
+        <p:spPr>
+          <a:xfrm>
+            <a:off x="5911555" y="2497009"/>
+            <a:ext cx="620683" cy="1015663"/>
+          </a:xfrm>
+          <a:prstGeom prst="rect">
+            <a:avLst/>
+          </a:prstGeom>
+          <a:noFill/>
+        </p:spPr>
+        <p:txBody>
+          <a:bodyPr wrap="none" rtlCol="0">
+            <a:spAutoFit/>
+          </a:bodyPr>
+          <a:lstStyle/>
+          <a:p>
+            <a:r>
+              <a:rPr lang="de-AT" sz="6000" dirty="0"/>
+              <a:t>V</a:t>
+            </a:r>
+          </a:p>
+        </p:txBody>
+      </p:sp>
+      <p:sp>
+        <p:nvSpPr>
+          <p:cNvPr id="6" name="TextBox 5">
+            <a:extLst>
+              <a:ext uri="{FF2B5EF4-FFF2-40B4-BE49-F238E27FC236}">
+                <a16:creationId xmlns:a16="http://schemas.microsoft.com/office/drawing/2014/main" id="{D0C2E6DA-24BF-40D4-A48C-5A900F99215B}"/>
+              </a:ext>
+            </a:extLst>
+          </p:cNvPr>
+          <p:cNvSpPr txBox="1"/>
+          <p:nvPr/>
+        </p:nvSpPr>
+        <p:spPr>
+          <a:xfrm>
+            <a:off x="6331819" y="2510506"/>
+            <a:ext cx="595035" cy="1015663"/>
+          </a:xfrm>
+          <a:prstGeom prst="rect">
+            <a:avLst/>
+          </a:prstGeom>
+          <a:noFill/>
+        </p:spPr>
+        <p:txBody>
+          <a:bodyPr wrap="none" rtlCol="0">
+            <a:spAutoFit/>
+          </a:bodyPr>
+          <a:lstStyle/>
+          <a:p>
+            <a:r>
+              <a:rPr lang="de-AT" sz="6000" dirty="0"/>
+              <a:t>C</a:t>
+            </a:r>
+          </a:p>
+        </p:txBody>
+      </p:sp>
     </p:spTree>
     <p:extLst>
       <p:ext uri="{BB962C8B-B14F-4D97-AF65-F5344CB8AC3E}">
@@ -3418,6 +3528,18 @@
   <p:clrMapOvr>
     <a:masterClrMapping/>
   </p:clrMapOvr>
+  <mc:AlternateContent xmlns:mc="http://schemas.openxmlformats.org/markup-compatibility/2006">
+    <mc:Choice xmlns:p159="http://schemas.microsoft.com/office/powerpoint/2015/09/main" Requires="p159">
+      <p:transition xmlns:p14="http://schemas.microsoft.com/office/powerpoint/2010/main" spd="slow" p14:dur="2000">
+        <p159:morph option="byObject"/>
+      </p:transition>
+    </mc:Choice>
+    <mc:Fallback>
+      <p:transition spd="slow">
+        <p:fade/>
+      </p:transition>
+    </mc:Fallback>
+  </mc:AlternateContent>
 </p:sld>
 </file>
 
@@ -3522,6 +3644,78 @@
           </a:p>
         </p:txBody>
       </p:sp>
+      <p:pic>
+        <p:nvPicPr>
+          <p:cNvPr id="3" name="Picture 2" descr="A close up of a sign&#10;&#10;Description automatically generated">
+            <a:extLst>
+              <a:ext uri="{FF2B5EF4-FFF2-40B4-BE49-F238E27FC236}">
+                <a16:creationId xmlns:a16="http://schemas.microsoft.com/office/drawing/2014/main" id="{3AA978E6-F860-475F-BD10-EB8419DC744B}"/>
+              </a:ext>
+            </a:extLst>
+          </p:cNvPr>
+          <p:cNvPicPr>
+            <a:picLocks noChangeAspect="1"/>
+          </p:cNvPicPr>
+          <p:nvPr/>
+        </p:nvPicPr>
+        <p:blipFill>
+          <a:blip r:embed="rId2">
+            <a:extLst>
+              <a:ext uri="{28A0092B-C50C-407E-A947-70E740481C1C}">
+                <a14:useLocalDpi xmlns:a14="http://schemas.microsoft.com/office/drawing/2010/main" val="0"/>
+              </a:ext>
+            </a:extLst>
+          </a:blip>
+          <a:stretch>
+            <a:fillRect/>
+          </a:stretch>
+        </p:blipFill>
+        <p:spPr>
+          <a:xfrm>
+            <a:off x="323794" y="5018222"/>
+            <a:ext cx="3460806" cy="1579428"/>
+          </a:xfrm>
+          <a:prstGeom prst="rect">
+            <a:avLst/>
+          </a:prstGeom>
+        </p:spPr>
+      </p:pic>
+      <p:pic>
+        <p:nvPicPr>
+          <p:cNvPr id="7" name="Picture 6" descr="A close up of a logo&#10;&#10;Description automatically generated">
+            <a:extLst>
+              <a:ext uri="{FF2B5EF4-FFF2-40B4-BE49-F238E27FC236}">
+                <a16:creationId xmlns:a16="http://schemas.microsoft.com/office/drawing/2014/main" id="{670DEC55-FAA2-4DA7-8F96-12644B8C413B}"/>
+              </a:ext>
+            </a:extLst>
+          </p:cNvPr>
+          <p:cNvPicPr>
+            <a:picLocks noChangeAspect="1"/>
+          </p:cNvPicPr>
+          <p:nvPr/>
+        </p:nvPicPr>
+        <p:blipFill>
+          <a:blip r:embed="rId3">
+            <a:extLst>
+              <a:ext uri="{28A0092B-C50C-407E-A947-70E740481C1C}">
+                <a14:useLocalDpi xmlns:a14="http://schemas.microsoft.com/office/drawing/2010/main" val="0"/>
+              </a:ext>
+            </a:extLst>
+          </a:blip>
+          <a:stretch>
+            <a:fillRect/>
+          </a:stretch>
+        </p:blipFill>
+        <p:spPr>
+          <a:xfrm>
+            <a:off x="3873500" y="4648200"/>
+            <a:ext cx="3698410" cy="2209800"/>
+          </a:xfrm>
+          <a:prstGeom prst="rect">
+            <a:avLst/>
+          </a:prstGeom>
+        </p:spPr>
+      </p:pic>
     </p:spTree>
     <p:extLst>
       <p:ext uri="{BB962C8B-B14F-4D97-AF65-F5344CB8AC3E}">
@@ -3532,6 +3726,18 @@
   <p:clrMapOvr>
     <a:masterClrMapping/>
   </p:clrMapOvr>
+  <mc:AlternateContent xmlns:mc="http://schemas.openxmlformats.org/markup-compatibility/2006">
+    <mc:Choice xmlns:p159="http://schemas.microsoft.com/office/powerpoint/2015/09/main" Requires="p159">
+      <p:transition xmlns:p14="http://schemas.microsoft.com/office/powerpoint/2010/main" spd="slow" p14:dur="2000">
+        <p159:morph option="byObject"/>
+      </p:transition>
+    </mc:Choice>
+    <mc:Fallback>
+      <p:transition spd="slow">
+        <p:fade/>
+      </p:transition>
+    </mc:Fallback>
+  </mc:AlternateContent>
 </p:sld>
 </file>
 
@@ -3602,6 +3808,18 @@
   <p:clrMapOvr>
     <a:masterClrMapping/>
   </p:clrMapOvr>
+  <mc:AlternateContent xmlns:mc="http://schemas.openxmlformats.org/markup-compatibility/2006">
+    <mc:Choice xmlns:p159="http://schemas.microsoft.com/office/powerpoint/2015/09/main" Requires="p159">
+      <p:transition xmlns:p14="http://schemas.microsoft.com/office/powerpoint/2010/main" spd="slow" p14:dur="2000">
+        <p159:morph option="byObject"/>
+      </p:transition>
+    </mc:Choice>
+    <mc:Fallback>
+      <p:transition spd="slow">
+        <p:fade/>
+      </p:transition>
+    </mc:Fallback>
+  </mc:AlternateContent>
 </p:sld>
 </file>
 
@@ -3731,6 +3949,146 @@
           </a:p>
         </p:txBody>
       </p:sp>
+      <p:sp>
+        <p:nvSpPr>
+          <p:cNvPr id="4" name="TextBox 3">
+            <a:extLst>
+              <a:ext uri="{FF2B5EF4-FFF2-40B4-BE49-F238E27FC236}">
+                <a16:creationId xmlns:a16="http://schemas.microsoft.com/office/drawing/2014/main" id="{54D14F4B-35DC-4F75-B80C-A7014246068A}"/>
+              </a:ext>
+            </a:extLst>
+          </p:cNvPr>
+          <p:cNvSpPr txBox="1"/>
+          <p:nvPr/>
+        </p:nvSpPr>
+        <p:spPr>
+          <a:xfrm>
+            <a:off x="1068404" y="1761423"/>
+            <a:ext cx="492443" cy="523220"/>
+          </a:xfrm>
+          <a:prstGeom prst="rect">
+            <a:avLst/>
+          </a:prstGeom>
+          <a:noFill/>
+        </p:spPr>
+        <p:txBody>
+          <a:bodyPr wrap="none" rtlCol="0">
+            <a:spAutoFit/>
+          </a:bodyPr>
+          <a:lstStyle/>
+          <a:p>
+            <a:r>
+              <a:rPr lang="de-AT" sz="2800" dirty="0"/>
+              <a:t>M</a:t>
+            </a:r>
+          </a:p>
+        </p:txBody>
+      </p:sp>
+      <p:sp>
+        <p:nvSpPr>
+          <p:cNvPr id="5" name="TextBox 4">
+            <a:extLst>
+              <a:ext uri="{FF2B5EF4-FFF2-40B4-BE49-F238E27FC236}">
+                <a16:creationId xmlns:a16="http://schemas.microsoft.com/office/drawing/2014/main" id="{C194B0E8-52D7-48C7-87FC-22E0EC88E0E6}"/>
+              </a:ext>
+            </a:extLst>
+          </p:cNvPr>
+          <p:cNvSpPr txBox="1"/>
+          <p:nvPr/>
+        </p:nvSpPr>
+        <p:spPr>
+          <a:xfrm>
+            <a:off x="2173705" y="1774043"/>
+            <a:ext cx="388248" cy="523220"/>
+          </a:xfrm>
+          <a:prstGeom prst="rect">
+            <a:avLst/>
+          </a:prstGeom>
+          <a:noFill/>
+        </p:spPr>
+        <p:txBody>
+          <a:bodyPr wrap="none" rtlCol="0">
+            <a:spAutoFit/>
+          </a:bodyPr>
+          <a:lstStyle/>
+          <a:p>
+            <a:r>
+              <a:rPr lang="de-AT" sz="2800" dirty="0"/>
+              <a:t>V</a:t>
+            </a:r>
+          </a:p>
+        </p:txBody>
+      </p:sp>
+      <p:sp>
+        <p:nvSpPr>
+          <p:cNvPr id="6" name="TextBox 5">
+            <a:extLst>
+              <a:ext uri="{FF2B5EF4-FFF2-40B4-BE49-F238E27FC236}">
+                <a16:creationId xmlns:a16="http://schemas.microsoft.com/office/drawing/2014/main" id="{746B657B-49F5-4E5D-A261-6123E2D0919F}"/>
+              </a:ext>
+            </a:extLst>
+          </p:cNvPr>
+          <p:cNvSpPr txBox="1"/>
+          <p:nvPr/>
+        </p:nvSpPr>
+        <p:spPr>
+          <a:xfrm>
+            <a:off x="3027078" y="1782144"/>
+            <a:ext cx="375424" cy="523220"/>
+          </a:xfrm>
+          <a:prstGeom prst="rect">
+            <a:avLst/>
+          </a:prstGeom>
+          <a:noFill/>
+        </p:spPr>
+        <p:txBody>
+          <a:bodyPr wrap="none" rtlCol="0">
+            <a:spAutoFit/>
+          </a:bodyPr>
+          <a:lstStyle/>
+          <a:p>
+            <a:r>
+              <a:rPr lang="de-AT" sz="2800" dirty="0"/>
+              <a:t>C</a:t>
+            </a:r>
+          </a:p>
+        </p:txBody>
+      </p:sp>
+      <p:sp>
+        <p:nvSpPr>
+          <p:cNvPr id="7" name="TextBox 6">
+            <a:extLst>
+              <a:ext uri="{FF2B5EF4-FFF2-40B4-BE49-F238E27FC236}">
+                <a16:creationId xmlns:a16="http://schemas.microsoft.com/office/drawing/2014/main" id="{412AFD5E-1521-4E68-A5FB-8DE00A3BD501}"/>
+              </a:ext>
+            </a:extLst>
+          </p:cNvPr>
+          <p:cNvSpPr txBox="1"/>
+          <p:nvPr/>
+        </p:nvSpPr>
+        <p:spPr>
+          <a:xfrm>
+            <a:off x="830981" y="606391"/>
+            <a:ext cx="1284198" cy="769441"/>
+          </a:xfrm>
+          <a:prstGeom prst="rect">
+            <a:avLst/>
+          </a:prstGeom>
+          <a:noFill/>
+        </p:spPr>
+        <p:txBody>
+          <a:bodyPr wrap="none" rtlCol="0">
+            <a:spAutoFit/>
+          </a:bodyPr>
+          <a:lstStyle/>
+          <a:p>
+            <a:r>
+              <a:rPr lang="de-AT" sz="4400" dirty="0"/>
+              <a:t>MVC</a:t>
+            </a:r>
+          </a:p>
+        </p:txBody>
+      </p:sp>
     </p:spTree>
     <p:extLst>
       <p:ext uri="{BB962C8B-B14F-4D97-AF65-F5344CB8AC3E}">
@@ -3741,6 +4099,18 @@
   <p:clrMapOvr>
     <a:masterClrMapping/>
   </p:clrMapOvr>
+  <mc:AlternateContent xmlns:mc="http://schemas.openxmlformats.org/markup-compatibility/2006">
+    <mc:Choice xmlns:p159="http://schemas.microsoft.com/office/powerpoint/2015/09/main" Requires="p159">
+      <p:transition xmlns:p14="http://schemas.microsoft.com/office/powerpoint/2010/main" spd="slow" p14:dur="2000">
+        <p159:morph option="byObject"/>
+      </p:transition>
+    </mc:Choice>
+    <mc:Fallback>
+      <p:transition spd="slow">
+        <p:fade/>
+      </p:transition>
+    </mc:Fallback>
+  </mc:AlternateContent>
 </p:sld>
 </file>
 
@@ -3839,6 +4209,76 @@
           </a:p>
         </p:txBody>
       </p:sp>
+      <p:sp>
+        <p:nvSpPr>
+          <p:cNvPr id="4" name="TextBox 3">
+            <a:extLst>
+              <a:ext uri="{FF2B5EF4-FFF2-40B4-BE49-F238E27FC236}">
+                <a16:creationId xmlns:a16="http://schemas.microsoft.com/office/drawing/2014/main" id="{6371CE2E-4478-4135-AD06-7F6C54FBE74E}"/>
+              </a:ext>
+            </a:extLst>
+          </p:cNvPr>
+          <p:cNvSpPr txBox="1"/>
+          <p:nvPr/>
+        </p:nvSpPr>
+        <p:spPr>
+          <a:xfrm>
+            <a:off x="2955089" y="616695"/>
+            <a:ext cx="1284198" cy="769441"/>
+          </a:xfrm>
+          <a:prstGeom prst="rect">
+            <a:avLst/>
+          </a:prstGeom>
+          <a:noFill/>
+        </p:spPr>
+        <p:txBody>
+          <a:bodyPr wrap="none" rtlCol="0">
+            <a:spAutoFit/>
+          </a:bodyPr>
+          <a:lstStyle/>
+          <a:p>
+            <a:r>
+              <a:rPr lang="de-AT" sz="4400" dirty="0"/>
+              <a:t>MVC</a:t>
+            </a:r>
+          </a:p>
+        </p:txBody>
+      </p:sp>
+      <p:sp>
+        <p:nvSpPr>
+          <p:cNvPr id="5" name="TextBox 4">
+            <a:extLst>
+              <a:ext uri="{FF2B5EF4-FFF2-40B4-BE49-F238E27FC236}">
+                <a16:creationId xmlns:a16="http://schemas.microsoft.com/office/drawing/2014/main" id="{6CF35C1F-F3FC-4FFD-88D7-D7C3A7E8E210}"/>
+              </a:ext>
+            </a:extLst>
+          </p:cNvPr>
+          <p:cNvSpPr txBox="1"/>
+          <p:nvPr/>
+        </p:nvSpPr>
+        <p:spPr>
+          <a:xfrm>
+            <a:off x="5045342" y="3191486"/>
+            <a:ext cx="2254913" cy="523220"/>
+          </a:xfrm>
+          <a:prstGeom prst="rect">
+            <a:avLst/>
+          </a:prstGeom>
+          <a:noFill/>
+        </p:spPr>
+        <p:txBody>
+          <a:bodyPr wrap="none" rtlCol="0">
+            <a:spAutoFit/>
+          </a:bodyPr>
+          <a:lstStyle/>
+          <a:p>
+            <a:r>
+              <a:rPr lang="de-AT" sz="2800" dirty="0"/>
+              <a:t>Komponenten</a:t>
+            </a:r>
+          </a:p>
+        </p:txBody>
+      </p:sp>
     </p:spTree>
     <p:extLst>
       <p:ext uri="{BB962C8B-B14F-4D97-AF65-F5344CB8AC3E}">
@@ -3849,6 +4289,18 @@
   <p:clrMapOvr>
     <a:masterClrMapping/>
   </p:clrMapOvr>
+  <mc:AlternateContent xmlns:mc="http://schemas.openxmlformats.org/markup-compatibility/2006">
+    <mc:Choice xmlns:p159="http://schemas.microsoft.com/office/powerpoint/2015/09/main" Requires="p159">
+      <p:transition xmlns:p14="http://schemas.microsoft.com/office/powerpoint/2010/main" spd="slow" p14:dur="2000">
+        <p159:morph option="byObject"/>
+      </p:transition>
+    </mc:Choice>
+    <mc:Fallback>
+      <p:transition spd="slow">
+        <p:fade/>
+      </p:transition>
+    </mc:Fallback>
+  </mc:AlternateContent>
 </p:sld>
 </file>
 
@@ -3918,7 +4370,98 @@
           <a:bodyPr/>
           <a:lstStyle/>
           <a:p>
-            <a:endParaRPr lang="de-AT"/>
+            <a:r>
+              <a:rPr lang="de-AT" dirty="0"/>
+              <a:t>View</a:t>
+            </a:r>
+          </a:p>
+          <a:p>
+            <a:r>
+              <a:rPr lang="de-AT" dirty="0"/>
+              <a:t>Controller</a:t>
+            </a:r>
+          </a:p>
+          <a:p>
+            <a:r>
+              <a:rPr lang="de-AT" dirty="0"/>
+              <a:t>Model</a:t>
+            </a:r>
+          </a:p>
+        </p:txBody>
+      </p:sp>
+      <p:sp>
+        <p:nvSpPr>
+          <p:cNvPr id="6" name="TextBox 5">
+            <a:extLst>
+              <a:ext uri="{FF2B5EF4-FFF2-40B4-BE49-F238E27FC236}">
+                <a16:creationId xmlns:a16="http://schemas.microsoft.com/office/drawing/2014/main" id="{4905157D-D8A5-4B89-8DA0-3C7FFFDFB3CE}"/>
+              </a:ext>
+            </a:extLst>
+          </p:cNvPr>
+          <p:cNvSpPr txBox="1"/>
+          <p:nvPr/>
+        </p:nvSpPr>
+        <p:spPr>
+          <a:xfrm>
+            <a:off x="810126" y="3566971"/>
+            <a:ext cx="4619726" cy="1015663"/>
+          </a:xfrm>
+          <a:prstGeom prst="rect">
+            <a:avLst/>
+          </a:prstGeom>
+          <a:noFill/>
+        </p:spPr>
+        <p:txBody>
+          <a:bodyPr wrap="none" rtlCol="0">
+            <a:spAutoFit/>
+          </a:bodyPr>
+          <a:lstStyle/>
+          <a:p>
+            <a:r>
+              <a:rPr lang="de-AT" sz="6000" dirty="0"/>
+              <a:t>Komponenten</a:t>
+            </a:r>
+          </a:p>
+        </p:txBody>
+      </p:sp>
+      <p:sp>
+        <p:nvSpPr>
+          <p:cNvPr id="7" name="TextBox 6">
+            <a:extLst>
+              <a:ext uri="{FF2B5EF4-FFF2-40B4-BE49-F238E27FC236}">
+                <a16:creationId xmlns:a16="http://schemas.microsoft.com/office/drawing/2014/main" id="{589B9B66-9897-4237-B26A-C711BC3B0AD0}"/>
+              </a:ext>
+            </a:extLst>
+          </p:cNvPr>
+          <p:cNvSpPr txBox="1"/>
+          <p:nvPr/>
+        </p:nvSpPr>
+        <p:spPr>
+          <a:xfrm>
+            <a:off x="837398" y="4553758"/>
+            <a:ext cx="801951" cy="461665"/>
+          </a:xfrm>
+          <a:prstGeom prst="rect">
+            <a:avLst/>
+          </a:prstGeom>
+          <a:noFill/>
+        </p:spPr>
+        <p:txBody>
+          <a:bodyPr wrap="none" rtlCol="0">
+            <a:spAutoFit/>
+          </a:bodyPr>
+          <a:lstStyle/>
+          <a:p>
+            <a:r>
+              <a:rPr lang="de-AT" sz="2400" dirty="0">
+                <a:solidFill>
+                  <a:schemeClr val="tx1">
+                    <a:tint val="75000"/>
+                  </a:schemeClr>
+                </a:solidFill>
+              </a:rPr>
+              <a:t>View</a:t>
+            </a:r>
           </a:p>
         </p:txBody>
       </p:sp>
@@ -3932,6 +4475,18 @@
   <p:clrMapOvr>
     <a:masterClrMapping/>
   </p:clrMapOvr>
+  <mc:AlternateContent xmlns:mc="http://schemas.openxmlformats.org/markup-compatibility/2006">
+    <mc:Choice xmlns:p159="http://schemas.microsoft.com/office/powerpoint/2015/09/main" Requires="p159">
+      <p:transition xmlns:p14="http://schemas.microsoft.com/office/powerpoint/2010/main" spd="slow" p14:dur="2000">
+        <p159:morph option="byObject"/>
+      </p:transition>
+    </mc:Choice>
+    <mc:Fallback>
+      <p:transition spd="slow">
+        <p:fade/>
+      </p:transition>
+    </mc:Fallback>
+  </mc:AlternateContent>
 </p:sld>
 </file>
 
@@ -3954,6 +4509,45 @@
       </p:grpSpPr>
       <p:sp>
         <p:nvSpPr>
+          <p:cNvPr id="7" name="TextBox 6">
+            <a:extLst>
+              <a:ext uri="{FF2B5EF4-FFF2-40B4-BE49-F238E27FC236}">
+                <a16:creationId xmlns:a16="http://schemas.microsoft.com/office/drawing/2014/main" id="{0FDF70C9-6690-438B-97FD-8A60697FFD3C}"/>
+              </a:ext>
+            </a:extLst>
+          </p:cNvPr>
+          <p:cNvSpPr txBox="1"/>
+          <p:nvPr/>
+        </p:nvSpPr>
+        <p:spPr>
+          <a:xfrm>
+            <a:off x="827774" y="607400"/>
+            <a:ext cx="1316835" cy="769441"/>
+          </a:xfrm>
+          <a:prstGeom prst="rect">
+            <a:avLst/>
+          </a:prstGeom>
+          <a:noFill/>
+        </p:spPr>
+        <p:txBody>
+          <a:bodyPr wrap="none" rtlCol="0">
+            <a:spAutoFit/>
+          </a:bodyPr>
+          <a:lstStyle/>
+          <a:p>
+            <a:r>
+              <a:rPr lang="de-AT" sz="4400" dirty="0">
+                <a:latin typeface="+mj-lt"/>
+                <a:ea typeface="+mj-ea"/>
+                <a:cs typeface="+mj-cs"/>
+              </a:rPr>
+              <a:t>View</a:t>
+            </a:r>
+          </a:p>
+        </p:txBody>
+      </p:sp>
+      <p:sp>
+        <p:nvSpPr>
           <p:cNvPr id="2" name="Title 1">
             <a:extLst>
               <a:ext uri="{FF2B5EF4-FFF2-40B4-BE49-F238E27FC236}">
@@ -3968,9 +4562,16 @@
             <p:ph type="title"/>
           </p:nvPr>
         </p:nvSpPr>
-        <p:spPr/>
-        <p:txBody>
-          <a:bodyPr/>
+        <p:spPr>
+          <a:xfrm>
+            <a:off x="825397" y="362530"/>
+            <a:ext cx="10515600" cy="1325563"/>
+          </a:xfrm>
+        </p:spPr>
+        <p:txBody>
+          <a:bodyPr>
+            <a:normAutofit/>
+          </a:bodyPr>
           <a:lstStyle/>
           <a:p>
             <a:r>
@@ -4024,7 +4625,11 @@
           <a:p>
             <a:r>
               <a:rPr lang="de-AT" dirty="0"/>
-              <a:t>zuständig für die Struktur und Darstellung</a:t>
+              <a:t>zuständig für die </a:t>
+            </a:r>
+            <a:r>
+              <a:rPr lang="de-AT" b="1" dirty="0"/>
+              <a:t>Struktur und Darstellung</a:t>
             </a:r>
           </a:p>
           <a:p>
@@ -4150,6 +4755,18 @@
   <p:clrMapOvr>
     <a:masterClrMapping/>
   </p:clrMapOvr>
+  <mc:AlternateContent xmlns:mc="http://schemas.openxmlformats.org/markup-compatibility/2006">
+    <mc:Choice xmlns:p159="http://schemas.microsoft.com/office/powerpoint/2015/09/main" Requires="p159">
+      <p:transition xmlns:p14="http://schemas.microsoft.com/office/powerpoint/2010/main" spd="slow" p14:dur="2000">
+        <p159:morph option="byObject"/>
+      </p:transition>
+    </mc:Choice>
+    <mc:Fallback>
+      <p:transition spd="slow">
+        <p:fade/>
+      </p:transition>
+    </mc:Fallback>
+  </mc:AlternateContent>
   <p:timing>
     <p:tnLst>
       <p:par>
@@ -4415,7 +5032,7 @@
         </p:blipFill>
         <p:spPr>
           <a:xfrm>
-            <a:off x="7758344" y="0"/>
+            <a:off x="7671717" y="125129"/>
             <a:ext cx="4433656" cy="2401564"/>
           </a:xfrm>
           <a:prstGeom prst="rect">
@@ -4423,6 +5040,41 @@
           </a:prstGeom>
         </p:spPr>
       </p:pic>
+      <p:sp>
+        <p:nvSpPr>
+          <p:cNvPr id="4" name="TextBox 3">
+            <a:extLst>
+              <a:ext uri="{FF2B5EF4-FFF2-40B4-BE49-F238E27FC236}">
+                <a16:creationId xmlns:a16="http://schemas.microsoft.com/office/drawing/2014/main" id="{26DE28FB-97B3-4EF0-9BF5-5938D3656A5D}"/>
+              </a:ext>
+            </a:extLst>
+          </p:cNvPr>
+          <p:cNvSpPr txBox="1"/>
+          <p:nvPr/>
+        </p:nvSpPr>
+        <p:spPr>
+          <a:xfrm>
+            <a:off x="8046720" y="3975233"/>
+            <a:ext cx="1130438" cy="523220"/>
+          </a:xfrm>
+          <a:prstGeom prst="rect">
+            <a:avLst/>
+          </a:prstGeom>
+          <a:noFill/>
+        </p:spPr>
+        <p:txBody>
+          <a:bodyPr wrap="none" rtlCol="0">
+            <a:spAutoFit/>
+          </a:bodyPr>
+          <a:lstStyle/>
+          <a:p>
+            <a:r>
+              <a:rPr lang="de-AT" sz="2800" dirty="0"/>
+              <a:t>Model</a:t>
+            </a:r>
+          </a:p>
+        </p:txBody>
+      </p:sp>
     </p:spTree>
     <p:extLst>
       <p:ext uri="{BB962C8B-B14F-4D97-AF65-F5344CB8AC3E}">
@@ -4433,241 +5085,18 @@
   <p:clrMapOvr>
     <a:masterClrMapping/>
   </p:clrMapOvr>
-</p:sld>
-</file>
-
-<file path=ppt/slides/slide7.xml><?xml version="1.0" encoding="utf-8"?>
-<p:sld xmlns:a="http://schemas.openxmlformats.org/drawingml/2006/main" xmlns:r="http://schemas.openxmlformats.org/officeDocument/2006/relationships" xmlns:p="http://schemas.openxmlformats.org/presentationml/2006/main">
-  <p:cSld>
-    <p:spTree>
-      <p:nvGrpSpPr>
-        <p:cNvPr id="1" name=""/>
-        <p:cNvGrpSpPr/>
-        <p:nvPr/>
-      </p:nvGrpSpPr>
-      <p:grpSpPr>
-        <a:xfrm>
-          <a:off x="0" y="0"/>
-          <a:ext cx="0" cy="0"/>
-          <a:chOff x="0" y="0"/>
-          <a:chExt cx="0" cy="0"/>
-        </a:xfrm>
-      </p:grpSpPr>
-      <p:sp>
-        <p:nvSpPr>
-          <p:cNvPr id="2" name="Title 1">
-            <a:extLst>
-              <a:ext uri="{FF2B5EF4-FFF2-40B4-BE49-F238E27FC236}">
-                <a16:creationId xmlns:a16="http://schemas.microsoft.com/office/drawing/2014/main" id="{551C2C9C-689F-44B0-9DBA-6B2526B6AA9F}"/>
-              </a:ext>
-            </a:extLst>
-          </p:cNvPr>
-          <p:cNvSpPr>
-            <a:spLocks noGrp="1"/>
-          </p:cNvSpPr>
-          <p:nvPr>
-            <p:ph type="title"/>
-          </p:nvPr>
-        </p:nvSpPr>
-        <p:spPr/>
-        <p:txBody>
-          <a:bodyPr/>
-          <a:lstStyle/>
-          <a:p>
-            <a:r>
-              <a:rPr lang="de-AT" dirty="0"/>
-              <a:t>Model</a:t>
-            </a:r>
-          </a:p>
-        </p:txBody>
-      </p:sp>
-      <p:sp>
-        <p:nvSpPr>
-          <p:cNvPr id="3" name="Content Placeholder 2">
-            <a:extLst>
-              <a:ext uri="{FF2B5EF4-FFF2-40B4-BE49-F238E27FC236}">
-                <a16:creationId xmlns:a16="http://schemas.microsoft.com/office/drawing/2014/main" id="{253EE9E5-05EB-4031-850C-B401B49D91CE}"/>
-              </a:ext>
-            </a:extLst>
-          </p:cNvPr>
-          <p:cNvSpPr>
-            <a:spLocks noGrp="1"/>
-          </p:cNvSpPr>
-          <p:nvPr>
-            <p:ph idx="1"/>
-          </p:nvPr>
-        </p:nvSpPr>
-        <p:spPr/>
-        <p:txBody>
-          <a:bodyPr/>
-          <a:lstStyle/>
-          <a:p>
-            <a:r>
-              <a:rPr lang="de-AT" dirty="0"/>
-              <a:t>enthält Business Logik</a:t>
-            </a:r>
-          </a:p>
-          <a:p>
-            <a:pPr lvl="1"/>
-            <a:r>
-              <a:rPr lang="de-AT" dirty="0"/>
-              <a:t>bestimmte Berechnungen</a:t>
-            </a:r>
-          </a:p>
-          <a:p>
-            <a:pPr lvl="1"/>
-            <a:r>
-              <a:rPr lang="de-AT" dirty="0"/>
-              <a:t>kann Data Access Layer enthalten</a:t>
-            </a:r>
-          </a:p>
-          <a:p>
-            <a:pPr lvl="2"/>
-            <a:r>
-              <a:rPr lang="de-AT" dirty="0"/>
-              <a:t>Database, REST API, ...</a:t>
-            </a:r>
-          </a:p>
-          <a:p>
-            <a:r>
-              <a:rPr lang="de-AT" dirty="0"/>
-              <a:t>kennt keinen Controller oder View</a:t>
-            </a:r>
-          </a:p>
-          <a:p>
-            <a:pPr lvl="1"/>
-            <a:r>
-              <a:rPr lang="de-AT" dirty="0"/>
-              <a:t>Benachrichtigungen mittels Events (z.B. </a:t>
-            </a:r>
-            <a:r>
-              <a:rPr lang="de-AT" dirty="0" err="1"/>
-              <a:t>INotifyPropertyChanged</a:t>
-            </a:r>
-            <a:r>
-              <a:rPr lang="de-AT" dirty="0"/>
-              <a:t>, </a:t>
-            </a:r>
-            <a:r>
-              <a:rPr lang="de-AT" dirty="0" err="1"/>
-              <a:t>ObservableCollection</a:t>
-            </a:r>
-            <a:r>
-              <a:rPr lang="de-AT" dirty="0"/>
-              <a:t>)</a:t>
-            </a:r>
-          </a:p>
-          <a:p>
-            <a:endParaRPr lang="de-AT" dirty="0"/>
-          </a:p>
-        </p:txBody>
-      </p:sp>
-    </p:spTree>
-    <p:extLst>
-      <p:ext uri="{BB962C8B-B14F-4D97-AF65-F5344CB8AC3E}">
-        <p14:creationId xmlns:p14="http://schemas.microsoft.com/office/powerpoint/2010/main" val="2506933209"/>
-      </p:ext>
-    </p:extLst>
-  </p:cSld>
-  <p:clrMapOvr>
-    <a:masterClrMapping/>
-  </p:clrMapOvr>
-</p:sld>
-</file>
-
-<file path=ppt/slides/slide8.xml><?xml version="1.0" encoding="utf-8"?>
-<p:sld xmlns:a="http://schemas.openxmlformats.org/drawingml/2006/main" xmlns:r="http://schemas.openxmlformats.org/officeDocument/2006/relationships" xmlns:p="http://schemas.openxmlformats.org/presentationml/2006/main">
-  <p:cSld>
-    <p:spTree>
-      <p:nvGrpSpPr>
-        <p:cNvPr id="1" name=""/>
-        <p:cNvGrpSpPr/>
-        <p:nvPr/>
-      </p:nvGrpSpPr>
-      <p:grpSpPr>
-        <a:xfrm>
-          <a:off x="0" y="0"/>
-          <a:ext cx="0" cy="0"/>
-          <a:chOff x="0" y="0"/>
-          <a:chExt cx="0" cy="0"/>
-        </a:xfrm>
-      </p:grpSpPr>
-      <p:sp>
-        <p:nvSpPr>
-          <p:cNvPr id="2" name="Title 1">
-            <a:extLst>
-              <a:ext uri="{FF2B5EF4-FFF2-40B4-BE49-F238E27FC236}">
-                <a16:creationId xmlns:a16="http://schemas.microsoft.com/office/drawing/2014/main" id="{DC9146E8-1369-41A2-9AD3-703228FD1A38}"/>
-              </a:ext>
-            </a:extLst>
-          </p:cNvPr>
-          <p:cNvSpPr>
-            <a:spLocks noGrp="1"/>
-          </p:cNvSpPr>
-          <p:nvPr>
-            <p:ph type="title"/>
-          </p:nvPr>
-        </p:nvSpPr>
-        <p:spPr/>
-        <p:txBody>
-          <a:bodyPr/>
-          <a:lstStyle/>
-          <a:p>
-            <a:r>
-              <a:rPr lang="de-AT" dirty="0"/>
-              <a:t>Ablauf</a:t>
-            </a:r>
-          </a:p>
-        </p:txBody>
-      </p:sp>
-      <p:pic>
-        <p:nvPicPr>
-          <p:cNvPr id="4" name="Content Placeholder 3" descr="A close up of a logo&#10;&#10;Description automatically generated">
-            <a:extLst>
-              <a:ext uri="{FF2B5EF4-FFF2-40B4-BE49-F238E27FC236}">
-                <a16:creationId xmlns:a16="http://schemas.microsoft.com/office/drawing/2014/main" id="{EA4B26CE-12B3-40CA-803D-B7BBB7F9C5C3}"/>
-              </a:ext>
-            </a:extLst>
-          </p:cNvPr>
-          <p:cNvPicPr>
-            <a:picLocks noGrp="1" noChangeAspect="1"/>
-          </p:cNvPicPr>
-          <p:nvPr>
-            <p:ph idx="1"/>
-          </p:nvPr>
-        </p:nvPicPr>
-        <p:blipFill>
-          <a:blip r:embed="rId2">
-            <a:extLst>
-              <a:ext uri="{28A0092B-C50C-407E-A947-70E740481C1C}">
-                <a14:useLocalDpi xmlns:a14="http://schemas.microsoft.com/office/drawing/2010/main" val="0"/>
-              </a:ext>
-            </a:extLst>
-          </a:blip>
-          <a:stretch>
-            <a:fillRect/>
-          </a:stretch>
-        </p:blipFill>
-        <p:spPr>
-          <a:xfrm>
-            <a:off x="1053565" y="2184602"/>
-            <a:ext cx="6575011" cy="1928670"/>
-          </a:xfrm>
-          <a:prstGeom prst="rect">
-            <a:avLst/>
-          </a:prstGeom>
-        </p:spPr>
-      </p:pic>
-    </p:spTree>
-    <p:extLst>
-      <p:ext uri="{BB962C8B-B14F-4D97-AF65-F5344CB8AC3E}">
-        <p14:creationId xmlns:p14="http://schemas.microsoft.com/office/powerpoint/2010/main" val="4082456557"/>
-      </p:ext>
-    </p:extLst>
-  </p:cSld>
-  <p:clrMapOvr>
-    <a:masterClrMapping/>
-  </p:clrMapOvr>
+  <mc:AlternateContent xmlns:mc="http://schemas.openxmlformats.org/markup-compatibility/2006">
+    <mc:Choice xmlns:p159="http://schemas.microsoft.com/office/powerpoint/2015/09/main" Requires="p159">
+      <p:transition xmlns:p14="http://schemas.microsoft.com/office/powerpoint/2010/main" spd="slow" p14:dur="2000">
+        <p159:morph option="byObject"/>
+      </p:transition>
+    </mc:Choice>
+    <mc:Fallback>
+      <p:transition spd="slow">
+        <p:fade/>
+      </p:transition>
+    </mc:Fallback>
+  </mc:AlternateContent>
   <p:timing>
     <p:tnLst>
       <p:par>
@@ -4702,7 +5131,7 @@
                                           </p:stCondLst>
                                         </p:cTn>
                                         <p:tgtEl>
-                                          <p:spTgt spid="4"/>
+                                          <p:spTgt spid="5"/>
                                         </p:tgtEl>
                                         <p:attrNameLst>
                                           <p:attrName>style.visibility</p:attrName>
@@ -4746,6 +5175,304 @@
 </p:sld>
 </file>
 
+<file path=ppt/slides/slide7.xml><?xml version="1.0" encoding="utf-8"?>
+<p:sld xmlns:a="http://schemas.openxmlformats.org/drawingml/2006/main" xmlns:r="http://schemas.openxmlformats.org/officeDocument/2006/relationships" xmlns:p="http://schemas.openxmlformats.org/presentationml/2006/main">
+  <p:cSld>
+    <p:spTree>
+      <p:nvGrpSpPr>
+        <p:cNvPr id="1" name=""/>
+        <p:cNvGrpSpPr/>
+        <p:nvPr/>
+      </p:nvGrpSpPr>
+      <p:grpSpPr>
+        <a:xfrm>
+          <a:off x="0" y="0"/>
+          <a:ext cx="0" cy="0"/>
+          <a:chOff x="0" y="0"/>
+          <a:chExt cx="0" cy="0"/>
+        </a:xfrm>
+      </p:grpSpPr>
+      <p:sp>
+        <p:nvSpPr>
+          <p:cNvPr id="2" name="Title 1">
+            <a:extLst>
+              <a:ext uri="{FF2B5EF4-FFF2-40B4-BE49-F238E27FC236}">
+                <a16:creationId xmlns:a16="http://schemas.microsoft.com/office/drawing/2014/main" id="{551C2C9C-689F-44B0-9DBA-6B2526B6AA9F}"/>
+              </a:ext>
+            </a:extLst>
+          </p:cNvPr>
+          <p:cNvSpPr>
+            <a:spLocks noGrp="1"/>
+          </p:cNvSpPr>
+          <p:nvPr>
+            <p:ph type="title"/>
+          </p:nvPr>
+        </p:nvSpPr>
+        <p:spPr/>
+        <p:txBody>
+          <a:bodyPr/>
+          <a:lstStyle/>
+          <a:p>
+            <a:r>
+              <a:rPr lang="de-AT" dirty="0"/>
+              <a:t>Model</a:t>
+            </a:r>
+          </a:p>
+        </p:txBody>
+      </p:sp>
+      <p:sp>
+        <p:nvSpPr>
+          <p:cNvPr id="3" name="Content Placeholder 2">
+            <a:extLst>
+              <a:ext uri="{FF2B5EF4-FFF2-40B4-BE49-F238E27FC236}">
+                <a16:creationId xmlns:a16="http://schemas.microsoft.com/office/drawing/2014/main" id="{253EE9E5-05EB-4031-850C-B401B49D91CE}"/>
+              </a:ext>
+            </a:extLst>
+          </p:cNvPr>
+          <p:cNvSpPr>
+            <a:spLocks noGrp="1"/>
+          </p:cNvSpPr>
+          <p:nvPr>
+            <p:ph idx="1"/>
+          </p:nvPr>
+        </p:nvSpPr>
+        <p:spPr/>
+        <p:txBody>
+          <a:bodyPr/>
+          <a:lstStyle/>
+          <a:p>
+            <a:r>
+              <a:rPr lang="de-AT" dirty="0"/>
+              <a:t>enthält Business Logik</a:t>
+            </a:r>
+          </a:p>
+          <a:p>
+            <a:pPr lvl="1"/>
+            <a:r>
+              <a:rPr lang="de-AT" dirty="0"/>
+              <a:t>bestimmte Berechnungen</a:t>
+            </a:r>
+          </a:p>
+          <a:p>
+            <a:pPr lvl="1"/>
+            <a:r>
+              <a:rPr lang="de-AT" dirty="0"/>
+              <a:t>kann Data Access Layer enthalten</a:t>
+            </a:r>
+          </a:p>
+          <a:p>
+            <a:pPr lvl="2"/>
+            <a:r>
+              <a:rPr lang="de-AT" dirty="0"/>
+              <a:t>Database, REST API, ...</a:t>
+            </a:r>
+          </a:p>
+          <a:p>
+            <a:r>
+              <a:rPr lang="de-AT" dirty="0"/>
+              <a:t>kennt keinen Controller oder View</a:t>
+            </a:r>
+          </a:p>
+          <a:p>
+            <a:pPr lvl="1"/>
+            <a:r>
+              <a:rPr lang="de-AT" dirty="0"/>
+              <a:t>Benachrichtigungen mittels Events (z.B. </a:t>
+            </a:r>
+            <a:r>
+              <a:rPr lang="de-AT" dirty="0" err="1"/>
+              <a:t>INotifyPropertyChanged</a:t>
+            </a:r>
+            <a:r>
+              <a:rPr lang="de-AT" dirty="0"/>
+              <a:t>, </a:t>
+            </a:r>
+            <a:r>
+              <a:rPr lang="de-AT" dirty="0" err="1"/>
+              <a:t>ObservableCollection</a:t>
+            </a:r>
+            <a:r>
+              <a:rPr lang="de-AT" dirty="0"/>
+              <a:t>)</a:t>
+            </a:r>
+          </a:p>
+          <a:p>
+            <a:endParaRPr lang="de-AT" dirty="0"/>
+          </a:p>
+        </p:txBody>
+      </p:sp>
+      <p:sp>
+        <p:nvSpPr>
+          <p:cNvPr id="4" name="TextBox 3">
+            <a:extLst>
+              <a:ext uri="{FF2B5EF4-FFF2-40B4-BE49-F238E27FC236}">
+                <a16:creationId xmlns:a16="http://schemas.microsoft.com/office/drawing/2014/main" id="{4A7FB725-52D5-4C03-9E4E-565B80BA6555}"/>
+              </a:ext>
+            </a:extLst>
+          </p:cNvPr>
+          <p:cNvSpPr txBox="1"/>
+          <p:nvPr/>
+        </p:nvSpPr>
+        <p:spPr>
+          <a:xfrm>
+            <a:off x="837398" y="599761"/>
+            <a:ext cx="1653017" cy="769441"/>
+          </a:xfrm>
+          <a:prstGeom prst="rect">
+            <a:avLst/>
+          </a:prstGeom>
+          <a:noFill/>
+        </p:spPr>
+        <p:txBody>
+          <a:bodyPr wrap="none" rtlCol="0">
+            <a:spAutoFit/>
+          </a:bodyPr>
+          <a:lstStyle/>
+          <a:p>
+            <a:r>
+              <a:rPr lang="de-AT" sz="4400" dirty="0">
+                <a:latin typeface="+mj-lt"/>
+                <a:ea typeface="+mj-ea"/>
+                <a:cs typeface="+mj-cs"/>
+              </a:rPr>
+              <a:t>Model</a:t>
+            </a:r>
+          </a:p>
+        </p:txBody>
+      </p:sp>
+    </p:spTree>
+    <p:extLst>
+      <p:ext uri="{BB962C8B-B14F-4D97-AF65-F5344CB8AC3E}">
+        <p14:creationId xmlns:p14="http://schemas.microsoft.com/office/powerpoint/2010/main" val="2506933209"/>
+      </p:ext>
+    </p:extLst>
+  </p:cSld>
+  <p:clrMapOvr>
+    <a:masterClrMapping/>
+  </p:clrMapOvr>
+  <mc:AlternateContent xmlns:mc="http://schemas.openxmlformats.org/markup-compatibility/2006">
+    <mc:Choice xmlns:p159="http://schemas.microsoft.com/office/powerpoint/2015/09/main" Requires="p159">
+      <p:transition xmlns:p14="http://schemas.microsoft.com/office/powerpoint/2010/main" spd="slow" p14:dur="2000">
+        <p159:morph option="byObject"/>
+      </p:transition>
+    </mc:Choice>
+    <mc:Fallback>
+      <p:transition spd="slow">
+        <p:fade/>
+      </p:transition>
+    </mc:Fallback>
+  </mc:AlternateContent>
+</p:sld>
+</file>
+
+<file path=ppt/slides/slide8.xml><?xml version="1.0" encoding="utf-8"?>
+<p:sld xmlns:a="http://schemas.openxmlformats.org/drawingml/2006/main" xmlns:r="http://schemas.openxmlformats.org/officeDocument/2006/relationships" xmlns:p="http://schemas.openxmlformats.org/presentationml/2006/main">
+  <p:cSld>
+    <p:spTree>
+      <p:nvGrpSpPr>
+        <p:cNvPr id="1" name=""/>
+        <p:cNvGrpSpPr/>
+        <p:nvPr/>
+      </p:nvGrpSpPr>
+      <p:grpSpPr>
+        <a:xfrm>
+          <a:off x="0" y="0"/>
+          <a:ext cx="0" cy="0"/>
+          <a:chOff x="0" y="0"/>
+          <a:chExt cx="0" cy="0"/>
+        </a:xfrm>
+      </p:grpSpPr>
+      <p:sp>
+        <p:nvSpPr>
+          <p:cNvPr id="2" name="Title 1">
+            <a:extLst>
+              <a:ext uri="{FF2B5EF4-FFF2-40B4-BE49-F238E27FC236}">
+                <a16:creationId xmlns:a16="http://schemas.microsoft.com/office/drawing/2014/main" id="{DC9146E8-1369-41A2-9AD3-703228FD1A38}"/>
+              </a:ext>
+            </a:extLst>
+          </p:cNvPr>
+          <p:cNvSpPr>
+            <a:spLocks noGrp="1"/>
+          </p:cNvSpPr>
+          <p:nvPr>
+            <p:ph type="title"/>
+          </p:nvPr>
+        </p:nvSpPr>
+        <p:spPr/>
+        <p:txBody>
+          <a:bodyPr/>
+          <a:lstStyle/>
+          <a:p>
+            <a:r>
+              <a:rPr lang="de-AT" dirty="0"/>
+              <a:t>Ablauf</a:t>
+            </a:r>
+          </a:p>
+        </p:txBody>
+      </p:sp>
+      <p:pic>
+        <p:nvPicPr>
+          <p:cNvPr id="4" name="Content Placeholder 3" descr="A close up of a logo&#10;&#10;Description automatically generated">
+            <a:extLst>
+              <a:ext uri="{FF2B5EF4-FFF2-40B4-BE49-F238E27FC236}">
+                <a16:creationId xmlns:a16="http://schemas.microsoft.com/office/drawing/2014/main" id="{EA4B26CE-12B3-40CA-803D-B7BBB7F9C5C3}"/>
+              </a:ext>
+            </a:extLst>
+          </p:cNvPr>
+          <p:cNvPicPr>
+            <a:picLocks noGrp="1" noChangeAspect="1"/>
+          </p:cNvPicPr>
+          <p:nvPr>
+            <p:ph idx="1"/>
+          </p:nvPr>
+        </p:nvPicPr>
+        <p:blipFill>
+          <a:blip r:embed="rId2">
+            <a:extLst>
+              <a:ext uri="{28A0092B-C50C-407E-A947-70E740481C1C}">
+                <a14:useLocalDpi xmlns:a14="http://schemas.microsoft.com/office/drawing/2010/main" val="0"/>
+              </a:ext>
+            </a:extLst>
+          </a:blip>
+          <a:stretch>
+            <a:fillRect/>
+          </a:stretch>
+        </p:blipFill>
+        <p:spPr>
+          <a:xfrm>
+            <a:off x="1053565" y="2184602"/>
+            <a:ext cx="6575011" cy="1928670"/>
+          </a:xfrm>
+          <a:prstGeom prst="rect">
+            <a:avLst/>
+          </a:prstGeom>
+        </p:spPr>
+      </p:pic>
+    </p:spTree>
+    <p:extLst>
+      <p:ext uri="{BB962C8B-B14F-4D97-AF65-F5344CB8AC3E}">
+        <p14:creationId xmlns:p14="http://schemas.microsoft.com/office/powerpoint/2010/main" val="4082456557"/>
+      </p:ext>
+    </p:extLst>
+  </p:cSld>
+  <p:clrMapOvr>
+    <a:masterClrMapping/>
+  </p:clrMapOvr>
+  <mc:AlternateContent xmlns:mc="http://schemas.openxmlformats.org/markup-compatibility/2006">
+    <mc:Choice xmlns:p159="http://schemas.microsoft.com/office/powerpoint/2015/09/main" Requires="p159">
+      <p:transition xmlns:p14="http://schemas.microsoft.com/office/powerpoint/2010/main" spd="slow" p14:dur="2000">
+        <p159:morph option="byObject"/>
+      </p:transition>
+    </mc:Choice>
+    <mc:Fallback>
+      <p:transition spd="slow">
+        <p:fade/>
+      </p:transition>
+    </mc:Fallback>
+  </mc:AlternateContent>
+</p:sld>
+</file>
+
 <file path=ppt/slides/slide9.xml><?xml version="1.0" encoding="utf-8"?>
 <p:sld xmlns:a="http://schemas.openxmlformats.org/drawingml/2006/main" xmlns:r="http://schemas.openxmlformats.org/officeDocument/2006/relationships" xmlns:p="http://schemas.openxmlformats.org/presentationml/2006/main">
   <p:cSld>
@@ -4786,7 +5513,27 @@
           <a:p>
             <a:r>
               <a:rPr lang="de-AT" dirty="0"/>
-              <a:t>	Vorteile					Nachteile</a:t>
+              <a:t>	</a:t>
+            </a:r>
+            <a:r>
+              <a:rPr lang="de-AT" b="1" dirty="0">
+                <a:solidFill>
+                  <a:schemeClr val="accent6"/>
+                </a:solidFill>
+              </a:rPr>
+              <a:t>Vorteile</a:t>
+            </a:r>
+            <a:r>
+              <a:rPr lang="de-AT" dirty="0"/>
+              <a:t>					</a:t>
+            </a:r>
+            <a:r>
+              <a:rPr lang="de-AT" b="1" dirty="0">
+                <a:solidFill>
+                  <a:srgbClr val="FF0000"/>
+                </a:solidFill>
+              </a:rPr>
+              <a:t>Nachteile</a:t>
             </a:r>
           </a:p>
         </p:txBody>
@@ -4875,6 +5622,18 @@
   <p:clrMapOvr>
     <a:masterClrMapping/>
   </p:clrMapOvr>
+  <mc:AlternateContent xmlns:mc="http://schemas.openxmlformats.org/markup-compatibility/2006">
+    <mc:Choice xmlns:p159="http://schemas.microsoft.com/office/powerpoint/2015/09/main" Requires="p159">
+      <p:transition xmlns:p14="http://schemas.microsoft.com/office/powerpoint/2010/main" spd="slow" p14:dur="2000">
+        <p159:morph option="byObject"/>
+      </p:transition>
+    </mc:Choice>
+    <mc:Fallback>
+      <p:transition spd="slow">
+        <p:fade/>
+      </p:transition>
+    </mc:Fallback>
+  </mc:AlternateContent>
 </p:sld>
 </file>
 

</xml_diff>